<commit_message>
Update contact information across all files
- Email: rejaul@nuqtaapp.com → rejaul@nuqtapp.com
- Phone: +971 XXX XXX XXX → +971 50 376 4345
- Updated in 16 files:
  - PowerPoint generators (both scripts)
  - All web pages (landing, card, memo, terms, etc.)
  - Pitch deck components
  - Both PowerPoint files regenerated and copied to public/

All investor-facing materials now have correct contact information.

Co-Authored-By: Claude Sonnet 4.5 <noreply@anthropic.com>
</commit_message>
<xml_diff>
--- a/Nuqta-Investor-One-Pager-2026.pptx
+++ b/Nuqta-Investor-One-Pager-2026.pptx
@@ -1916,7 +1916,7 @@
                   <a:srgbClr val="FFFFFF"/>
                 </a:solidFill>
               </a:rPr>
-              <a:t>rejaul@nuqtaapp.com
+              <a:t>rejaul@nuqtapp.com
 </a:t>
             </a:r>
             <a:pPr algn="ctr" indent="0" marL="0">
@@ -6597,7 +6597,7 @@
                   <a:srgbClr val="FFFFFF"/>
                 </a:solidFill>
               </a:rPr>
-              <a:t>rejaul@nuqtaapp.com
+              <a:t>rejaul@nuqtapp.com
 </a:t>
             </a:r>
             <a:pPr algn="ctr" indent="0" marL="0">

</xml_diff>